<commit_message>
Novas modificações e arquivos novos
</commit_message>
<xml_diff>
--- a/Docs/Project/Modulo 2 - Visualizacao e classificadores de dados em tempo real.pptx
+++ b/Docs/Project/Modulo 2 - Visualizacao e classificadores de dados em tempo real.pptx
@@ -12,7 +12,7 @@
   </p:handoutMasterIdLst>
   <p:sldIdLst>
     <p:sldId id="265" r:id="rId5"/>
-    <p:sldId id="310" r:id="rId6"/>
+    <p:sldId id="333" r:id="rId6"/>
     <p:sldId id="311" r:id="rId7"/>
     <p:sldId id="312" r:id="rId8"/>
     <p:sldId id="314" r:id="rId9"/>
@@ -5176,7 +5176,7 @@
         </p:blipFill>
         <p:spPr>
           <a:xfrm>
-            <a:off x="837828" y="2348880"/>
+            <a:off x="1773932" y="2348880"/>
             <a:ext cx="8640960" cy="4284296"/>
           </a:xfrm>
           <a:prstGeom prst="rect">
@@ -5343,8 +5343,8 @@
         </p:blipFill>
         <p:spPr>
           <a:xfrm>
-            <a:off x="1053852" y="2316219"/>
-            <a:ext cx="7776864" cy="4313180"/>
+            <a:off x="2025960" y="2316219"/>
+            <a:ext cx="8136904" cy="4313180"/>
           </a:xfrm>
           <a:prstGeom prst="rect">
             <a:avLst/>
@@ -5534,7 +5534,7 @@
         </p:blipFill>
         <p:spPr>
           <a:xfrm>
-            <a:off x="765820" y="3140968"/>
+            <a:off x="2039094" y="3140968"/>
             <a:ext cx="8110636" cy="3452297"/>
           </a:xfrm>
           <a:prstGeom prst="rect">
@@ -5659,15 +5659,7 @@
             </a:pPr>
             <a:r>
               <a:rPr lang="pt-BR" sz="1800" dirty="0"/>
-              <a:t>Inicialmente a requisição terá, como resposta, uma tela com todas as novas previsões com os campos “erro” e “measurements” em branco, isso porque as medições históricas reais, para comparação, ainda serão carregadas mediante uso de outra funcionalidade (</a:t>
-            </a:r>
-            <a:r>
-              <a:rPr lang="pt-BR" sz="1800" dirty="0" err="1"/>
-              <a:t>forecast_evaluation</a:t>
-            </a:r>
-            <a:r>
-              <a:rPr lang="pt-BR" sz="1800" dirty="0"/>
-              <a:t>).</a:t>
+              <a:t>Inicialmente a requisição terá, como resposta, uma tela com todas as novas previsões com os campos “erro” e “measurements” em branco, isso porque as medições históricas reais, para comparação, ainda serão carregadas mediante uso de outra funcionalidade (forecast_evaluation).</a:t>
             </a:r>
           </a:p>
           <a:p>
@@ -5715,7 +5707,7 @@
         </p:blipFill>
         <p:spPr>
           <a:xfrm>
-            <a:off x="1341884" y="2585440"/>
+            <a:off x="2025960" y="2585440"/>
             <a:ext cx="8136904" cy="4130266"/>
           </a:xfrm>
           <a:prstGeom prst="rect">
@@ -5875,8 +5867,8 @@
         </p:blipFill>
         <p:spPr>
           <a:xfrm>
-            <a:off x="1485900" y="1916832"/>
-            <a:ext cx="8280920" cy="4760424"/>
+            <a:off x="1953952" y="2420888"/>
+            <a:ext cx="8280920" cy="4256368"/>
           </a:xfrm>
           <a:prstGeom prst="rect">
             <a:avLst/>
@@ -6033,7 +6025,7 @@
         </p:blipFill>
         <p:spPr>
           <a:xfrm>
-            <a:off x="1053852" y="2204864"/>
+            <a:off x="1485900" y="2204864"/>
             <a:ext cx="9217024" cy="4428144"/>
           </a:xfrm>
           <a:prstGeom prst="rect">
@@ -6183,7 +6175,7 @@
     </p:spTree>
     <p:extLst>
       <p:ext uri="{BB962C8B-B14F-4D97-AF65-F5344CB8AC3E}">
-        <p14:creationId xmlns:p14="http://schemas.microsoft.com/office/powerpoint/2010/main" val="2139132589"/>
+        <p14:creationId xmlns:p14="http://schemas.microsoft.com/office/powerpoint/2010/main" val="1034546866"/>
       </p:ext>
     </p:extLst>
   </p:cSld>
@@ -6336,7 +6328,7 @@
         </p:blipFill>
         <p:spPr>
           <a:xfrm>
-            <a:off x="1197868" y="2204864"/>
+            <a:off x="1701924" y="2204864"/>
             <a:ext cx="8784976" cy="4112978"/>
           </a:xfrm>
           <a:prstGeom prst="rect">
@@ -6480,10 +6472,10 @@
       </p:sp>
       <p:pic>
         <p:nvPicPr>
-          <p:cNvPr id="5" name="Imagem 4">
+          <p:cNvPr id="2" name="Imagem 1">
             <a:extLst>
               <a:ext uri="{FF2B5EF4-FFF2-40B4-BE49-F238E27FC236}">
-                <a16:creationId xmlns:a16="http://schemas.microsoft.com/office/drawing/2014/main" id="{EC26FA6B-E04C-40F5-9868-B05A159958A6}"/>
+                <a16:creationId xmlns:a16="http://schemas.microsoft.com/office/drawing/2014/main" id="{E6FF6E03-FFC1-47BD-A3ED-94DB7D633DF4}"/>
               </a:ext>
             </a:extLst>
           </p:cNvPr>
@@ -6500,8 +6492,8 @@
         </p:blipFill>
         <p:spPr>
           <a:xfrm>
-            <a:off x="1125860" y="1781863"/>
-            <a:ext cx="10280638" cy="4383441"/>
+            <a:off x="1368928" y="1988840"/>
+            <a:ext cx="9450969" cy="3724795"/>
           </a:xfrm>
           <a:prstGeom prst="rect">
             <a:avLst/>
@@ -6664,7 +6656,7 @@
         </p:blipFill>
         <p:spPr>
           <a:xfrm>
-            <a:off x="333772" y="2508268"/>
+            <a:off x="477788" y="2508268"/>
             <a:ext cx="11233249" cy="3441011"/>
           </a:xfrm>
           <a:prstGeom prst="rect">
@@ -7370,8 +7362,8 @@
         </p:blipFill>
         <p:spPr>
           <a:xfrm>
-            <a:off x="1629916" y="1120380"/>
-            <a:ext cx="8933129" cy="5206959"/>
+            <a:off x="1555839" y="1120380"/>
+            <a:ext cx="9077146" cy="5206959"/>
           </a:xfrm>
           <a:prstGeom prst="rect">
             <a:avLst/>
@@ -7473,8 +7465,8 @@
         </p:blipFill>
         <p:spPr>
           <a:xfrm>
-            <a:off x="2854052" y="1066605"/>
-            <a:ext cx="7617708" cy="5553715"/>
+            <a:off x="1637486" y="1066605"/>
+            <a:ext cx="8913852" cy="5553715"/>
           </a:xfrm>
           <a:prstGeom prst="rect">
             <a:avLst/>
@@ -8360,15 +8352,6 @@
 </file>
 
 <file path=customXml/item1.xml><?xml version="1.0" encoding="utf-8"?>
-<?mso-contentType ?>
-<FormTemplates xmlns="http://schemas.microsoft.com/sharepoint/v3/contenttype/forms">
-  <Display>DocumentLibraryForm</Display>
-  <Edit>AssetEditForm</Edit>
-  <New>DocumentLibraryForm</New>
-</FormTemplates>
-</file>
-
-<file path=customXml/item2.xml><?xml version="1.0" encoding="utf-8"?>
 <ct:contentTypeSchema xmlns:ct="http://schemas.microsoft.com/office/2006/metadata/contentType" xmlns:ma="http://schemas.microsoft.com/office/2006/metadata/properties/metaAttributes" ct:_="" ma:_="" ma:contentTypeName="TemplateFile" ma:contentTypeID="0x0101006EDDDB5EE6D98C44930B742096920B300400F5B6D36B3EF94B4E9A635CDF2A18F5B8" ma:contentTypeVersion="72" ma:contentTypeDescription="Create a new document." ma:contentTypeScope="" ma:versionID="a23e56308344d904b51738559c3d67c9">
   <xsd:schema xmlns:xsd="http://www.w3.org/2001/XMLSchema" xmlns:xs="http://www.w3.org/2001/XMLSchema" xmlns:p="http://schemas.microsoft.com/office/2006/metadata/properties" xmlns:ns2="4873beb7-5857-4685-be1f-d57550cc96cc" targetNamespace="http://schemas.microsoft.com/office/2006/metadata/properties" ma:root="true" ma:fieldsID="cd0908cc4600e77bf5da051303e00c8d" ns2:_="">
     <xsd:import namespace="4873beb7-5857-4685-be1f-d57550cc96cc"/>
@@ -9408,6 +9391,15 @@
 </ct:contentTypeSchema>
 </file>
 
+<file path=customXml/item2.xml><?xml version="1.0" encoding="utf-8"?>
+<?mso-contentType ?>
+<FormTemplates xmlns="http://schemas.microsoft.com/sharepoint/v3/contenttype/forms">
+  <Display>DocumentLibraryForm</Display>
+  <Edit>AssetEditForm</Edit>
+  <New>DocumentLibraryForm</New>
+</FormTemplates>
+</file>
+
 <file path=customXml/item3.xml><?xml version="1.0" encoding="utf-8"?>
 <p:properties xmlns:p="http://schemas.microsoft.com/office/2006/metadata/properties" xmlns:xsi="http://www.w3.org/2001/XMLSchema-instance" xmlns:pc="http://schemas.microsoft.com/office/infopath/2007/PartnerControls">
   <documentManagement>
@@ -9536,14 +9528,6 @@
 </file>
 
 <file path=customXml/itemProps1.xml><?xml version="1.0" encoding="utf-8"?>
-<ds:datastoreItem xmlns:ds="http://schemas.openxmlformats.org/officeDocument/2006/customXml" ds:itemID="{74228E6B-D70C-44BB-A81F-A245495F612B}">
-  <ds:schemaRefs>
-    <ds:schemaRef ds:uri="http://schemas.microsoft.com/sharepoint/v3/contenttype/forms"/>
-  </ds:schemaRefs>
-</ds:datastoreItem>
-</file>
-
-<file path=customXml/itemProps2.xml><?xml version="1.0" encoding="utf-8"?>
 <ds:datastoreItem xmlns:ds="http://schemas.openxmlformats.org/officeDocument/2006/customXml" ds:itemID="{22CCB507-0646-4A50-A4F7-7F385079D589}">
   <ds:schemaRefs>
     <ds:schemaRef ds:uri="http://schemas.microsoft.com/office/2006/metadata/contentType"/>
@@ -9561,6 +9545,14 @@
 </ds:datastoreItem>
 </file>
 
+<file path=customXml/itemProps2.xml><?xml version="1.0" encoding="utf-8"?>
+<ds:datastoreItem xmlns:ds="http://schemas.openxmlformats.org/officeDocument/2006/customXml" ds:itemID="{74228E6B-D70C-44BB-A81F-A245495F612B}">
+  <ds:schemaRefs>
+    <ds:schemaRef ds:uri="http://schemas.microsoft.com/sharepoint/v3/contenttype/forms"/>
+  </ds:schemaRefs>
+</ds:datastoreItem>
+</file>
+
 <file path=customXml/itemProps3.xml><?xml version="1.0" encoding="utf-8"?>
 <ds:datastoreItem xmlns:ds="http://schemas.openxmlformats.org/officeDocument/2006/customXml" ds:itemID="{00E41224-0370-4595-877C-23316CD80004}">
   <ds:schemaRefs>

</xml_diff>